<commit_message>
update all lecture templates
</commit_message>
<xml_diff>
--- a/lectures/GenViz_Module1_Lecture.pptx
+++ b/lectures/GenViz_Module1_Lecture.pptx
@@ -115,7 +115,7 @@
   </p:defaultTextStyle>
   <p:extLst>
     <p:ext uri="{EFAFB233-063F-42B5-8137-9DF3F51BA10A}">
-      <p15:sldGuideLst xmlns:p15="http://schemas.microsoft.com/office/powerpoint/2012/main" xmlns="">
+      <p15:sldGuideLst xmlns="" xmlns:p15="http://schemas.microsoft.com/office/powerpoint/2012/main">
         <p15:guide id="1" orient="horz" pos="2160">
           <p15:clr>
             <a:srgbClr val="A4A3A4"/>
@@ -215,7 +215,7 @@
             <a:fld id="{03643E35-CD80-874A-A3D7-254E954BB753}" type="datetimeFigureOut">
               <a:rPr lang="en-US" smtClean="0"/>
               <a:pPr/>
-              <a:t>7/28/17</a:t>
+              <a:t>8/25/17</a:t>
             </a:fld>
             <a:endParaRPr lang="en-US"/>
           </a:p>
@@ -382,7 +382,7 @@
             <a:fld id="{5C416C15-7665-174C-99B8-5B237ACA6582}" type="datetimeFigureOut">
               <a:rPr lang="en-US" smtClean="0"/>
               <a:pPr/>
-              <a:t>7/28/17</a:t>
+              <a:t>8/25/17</a:t>
             </a:fld>
             <a:endParaRPr lang="en-US"/>
           </a:p>
@@ -2948,11 +2948,7 @@
             </a:r>
             <a:r>
               <a:rPr lang="en-US" dirty="0" smtClean="0"/>
-              <a:t> Module </a:t>
-            </a:r>
-            <a:r>
-              <a:rPr lang="en-US" dirty="0" smtClean="0"/>
-              <a:t>1:</a:t>
+              <a:t> Module 1:</a:t>
             </a:r>
             <a:br>
               <a:rPr lang="en-US" dirty="0" smtClean="0"/>
@@ -2963,7 +2959,15 @@
             </a:r>
             <a:r>
               <a:rPr lang="en-US" dirty="0"/>
-              <a:t>to genomic data visualization and </a:t>
+              <a:t>to </a:t>
+            </a:r>
+            <a:r>
+              <a:rPr lang="en-US" dirty="0" smtClean="0"/>
+              <a:t>genomic data visualization </a:t>
+            </a:r>
+            <a:r>
+              <a:rPr lang="en-US" dirty="0"/>
+              <a:t>and </a:t>
             </a:r>
             <a:r>
               <a:rPr lang="en-US" dirty="0" smtClean="0"/>
@@ -3294,49 +3298,91 @@
         <p:spPr/>
         <p:txBody>
           <a:bodyPr>
-            <a:normAutofit/>
+            <a:normAutofit fontScale="92500"/>
           </a:bodyPr>
           <a:lstStyle/>
           <a:p>
             <a:r>
               <a:rPr lang="en-US" b="1" dirty="0" smtClean="0"/>
-              <a:t>Module 1: Introduction to genomic data visualization and interpretation</a:t>
-            </a:r>
-          </a:p>
-          <a:p>
+              <a:t>Module 1: </a:t>
+            </a:r>
+            <a:r>
+              <a:rPr lang="en-US" b="1" dirty="0"/>
+              <a:t>Introduction to genomic data visualization and interpretation</a:t>
+            </a:r>
+            <a:endParaRPr lang="en-US" b="1" dirty="0" smtClean="0"/>
+          </a:p>
+          <a:p>
+            <a:r>
+              <a:rPr lang="en-US" dirty="0" smtClean="0"/>
+              <a:t>Module 2</a:t>
+            </a:r>
             <a:r>
               <a:rPr lang="en-US" dirty="0"/>
-              <a:t>Module 2: </a:t>
+              <a:t>: Using R for genomic data visualization and </a:t>
             </a:r>
             <a:r>
               <a:rPr lang="en-US" dirty="0" smtClean="0"/>
-              <a:t>Genomic visualization in R</a:t>
+              <a:t>interpretation</a:t>
             </a:r>
           </a:p>
           <a:p>
             <a:r>
               <a:rPr lang="en-US" dirty="0" smtClean="0"/>
-              <a:t>Module 3: Differential </a:t>
+              <a:t>Module </a:t>
+            </a:r>
+            <a:r>
+              <a:rPr lang="en-US" dirty="0" smtClean="0"/>
+              <a:t>3: </a:t>
             </a:r>
             <a:r>
               <a:rPr lang="en-US" dirty="0"/>
-              <a:t>gene </a:t>
-            </a:r>
+              <a:t>Introduction to </a:t>
+            </a:r>
+            <a:r>
+              <a:rPr lang="en-US" dirty="0" err="1" smtClean="0"/>
+              <a:t>GenVisR</a:t>
+            </a:r>
+            <a:endParaRPr lang="en-US" dirty="0" smtClean="0"/>
+          </a:p>
+          <a:p>
+            <a:r>
+              <a:rPr lang="en-US" dirty="0"/>
+              <a:t>Module 4: Expression profiling, visualization, and interpretation</a:t>
+            </a:r>
+            <a:endParaRPr lang="en-US" dirty="0" smtClean="0"/>
+          </a:p>
+          <a:p>
             <a:r>
               <a:rPr lang="en-US" dirty="0" smtClean="0"/>
-              <a:t>expression, pathway analysis and visualization</a:t>
-            </a:r>
-          </a:p>
-          <a:p>
+              <a:t>Module </a:t>
+            </a:r>
             <a:r>
               <a:rPr lang="en-US" dirty="0" smtClean="0"/>
-              <a:t>Module 4: Variant annotation and interpretation</a:t>
-            </a:r>
+              <a:t>5</a:t>
+            </a:r>
+            <a:r>
+              <a:rPr lang="en-US" dirty="0"/>
+              <a:t>: Variant annotation and interpretation</a:t>
+            </a:r>
+            <a:endParaRPr lang="en-US" dirty="0" smtClean="0"/>
           </a:p>
           <a:p>
             <a:r>
               <a:rPr lang="en-US" dirty="0" smtClean="0"/>
-              <a:t>Module 5: Review, Q &amp; A, discussion, and working with your own data</a:t>
+              <a:t>Module </a:t>
+            </a:r>
+            <a:r>
+              <a:rPr lang="en-US" dirty="0" smtClean="0"/>
+              <a:t>6</a:t>
+            </a:r>
+            <a:r>
+              <a:rPr lang="en-US" dirty="0"/>
+              <a:t>: Q &amp; A, discussion, integrated assignments, and working with your own </a:t>
+            </a:r>
+            <a:r>
+              <a:rPr lang="en-US" dirty="0" smtClean="0"/>
+              <a:t>data</a:t>
             </a:r>
           </a:p>
           <a:p>
@@ -3740,7 +3786,7 @@
   <a:extraClrSchemeLst/>
   <a:extLst>
     <a:ext uri="{05A4C25C-085E-4340-85A3-A5531E510DB2}">
-      <thm15:themeFamily xmlns:thm15="http://schemas.microsoft.com/office/thememl/2012/main" xmlns="" name="MGI_4-3_ratio_v1a" id="{9A0171FA-20F4-F840-B1C8-29D686AB0540}" vid="{60506783-C923-7847-B1CA-7C860CC95497}"/>
+      <thm15:themeFamily xmlns="" xmlns:thm15="http://schemas.microsoft.com/office/thememl/2012/main" name="MGI_4-3_ratio_v1a" id="{9A0171FA-20F4-F840-B1C8-29D686AB0540}" vid="{60506783-C923-7847-B1CA-7C860CC95497}"/>
     </a:ext>
   </a:extLst>
 </a:theme>

</xml_diff>